<commit_message>
updated slides before techie tea time
</commit_message>
<xml_diff>
--- a/FE_P4/Techie_0224.pptx
+++ b/FE_P4/Techie_0224.pptx
@@ -523,6 +523,184 @@
           <a:lstStyle/>
           <a:p>
             <a:r>
+              <a:rPr lang="en-US" dirty="0" smtClean="0"/>
+              <a:t>There are a lot of things you can do but the goal is not to maintain 60fps all the</a:t>
+            </a:r>
+            <a:r>
+              <a:rPr lang="en-US" baseline="0" dirty="0" smtClean="0"/>
+              <a:t> time. Here is the list of threshold for common users.</a:t>
+            </a:r>
+          </a:p>
+          <a:p>
+            <a:endParaRPr lang="en-US" dirty="0"/>
+          </a:p>
+        </p:txBody>
+      </p:sp>
+      <p:sp>
+        <p:nvSpPr>
+          <p:cNvPr id="4" name="Slide Number Placeholder 3"/>
+          <p:cNvSpPr>
+            <a:spLocks noGrp="1"/>
+          </p:cNvSpPr>
+          <p:nvPr>
+            <p:ph type="sldNum" sz="quarter" idx="10"/>
+          </p:nvPr>
+        </p:nvSpPr>
+        <p:spPr/>
+        <p:txBody>
+          <a:bodyPr/>
+          <a:lstStyle/>
+          <a:p>
+            <a:fld id="{DB40FAD2-B504-804D-97F4-69BB9EC26929}" type="slidenum">
+              <a:rPr lang="en-US" smtClean="0"/>
+              <a:t>12</a:t>
+            </a:fld>
+            <a:endParaRPr lang="en-US"/>
+          </a:p>
+        </p:txBody>
+      </p:sp>
+    </p:spTree>
+    <p:extLst>
+      <p:ext uri="{BB962C8B-B14F-4D97-AF65-F5344CB8AC3E}">
+        <p14:creationId xmlns:p14="http://schemas.microsoft.com/office/powerpoint/2010/main" val="2824407907"/>
+      </p:ext>
+    </p:extLst>
+  </p:cSld>
+  <p:clrMapOvr>
+    <a:masterClrMapping/>
+  </p:clrMapOvr>
+</p:notes>
+</file>
+
+<file path=ppt/notesSlides/notesSlide2.xml><?xml version="1.0" encoding="utf-8"?>
+<p:notes xmlns:a="http://schemas.openxmlformats.org/drawingml/2006/main" xmlns:r="http://schemas.openxmlformats.org/officeDocument/2006/relationships" xmlns:p="http://schemas.openxmlformats.org/presentationml/2006/main">
+  <p:cSld>
+    <p:spTree>
+      <p:nvGrpSpPr>
+        <p:cNvPr id="1" name=""/>
+        <p:cNvGrpSpPr/>
+        <p:nvPr/>
+      </p:nvGrpSpPr>
+      <p:grpSpPr>
+        <a:xfrm>
+          <a:off x="0" y="0"/>
+          <a:ext cx="0" cy="0"/>
+          <a:chOff x="0" y="0"/>
+          <a:chExt cx="0" cy="0"/>
+        </a:xfrm>
+      </p:grpSpPr>
+      <p:sp>
+        <p:nvSpPr>
+          <p:cNvPr id="2" name="Slide Image Placeholder 1"/>
+          <p:cNvSpPr>
+            <a:spLocks noGrp="1" noRot="1" noChangeAspect="1"/>
+          </p:cNvSpPr>
+          <p:nvPr>
+            <p:ph type="sldImg"/>
+          </p:nvPr>
+        </p:nvSpPr>
+        <p:spPr/>
+      </p:sp>
+      <p:sp>
+        <p:nvSpPr>
+          <p:cNvPr id="3" name="Notes Placeholder 2"/>
+          <p:cNvSpPr>
+            <a:spLocks noGrp="1"/>
+          </p:cNvSpPr>
+          <p:nvPr>
+            <p:ph type="body" idx="1"/>
+          </p:nvPr>
+        </p:nvSpPr>
+        <p:spPr/>
+        <p:txBody>
+          <a:bodyPr/>
+          <a:lstStyle/>
+          <a:p>
+            <a:endParaRPr lang="en-US" dirty="0"/>
+          </a:p>
+        </p:txBody>
+      </p:sp>
+      <p:sp>
+        <p:nvSpPr>
+          <p:cNvPr id="4" name="Slide Number Placeholder 3"/>
+          <p:cNvSpPr>
+            <a:spLocks noGrp="1"/>
+          </p:cNvSpPr>
+          <p:nvPr>
+            <p:ph type="sldNum" sz="quarter" idx="10"/>
+          </p:nvPr>
+        </p:nvSpPr>
+        <p:spPr/>
+        <p:txBody>
+          <a:bodyPr/>
+          <a:lstStyle/>
+          <a:p>
+            <a:fld id="{DB40FAD2-B504-804D-97F4-69BB9EC26929}" type="slidenum">
+              <a:rPr lang="en-US" smtClean="0"/>
+              <a:t>13</a:t>
+            </a:fld>
+            <a:endParaRPr lang="en-US"/>
+          </a:p>
+        </p:txBody>
+      </p:sp>
+    </p:spTree>
+    <p:extLst>
+      <p:ext uri="{BB962C8B-B14F-4D97-AF65-F5344CB8AC3E}">
+        <p14:creationId xmlns:p14="http://schemas.microsoft.com/office/powerpoint/2010/main" val="3362947851"/>
+      </p:ext>
+    </p:extLst>
+  </p:cSld>
+  <p:clrMapOvr>
+    <a:masterClrMapping/>
+  </p:clrMapOvr>
+</p:notes>
+</file>
+
+<file path=ppt/notesSlides/notesSlide3.xml><?xml version="1.0" encoding="utf-8"?>
+<p:notes xmlns:a="http://schemas.openxmlformats.org/drawingml/2006/main" xmlns:r="http://schemas.openxmlformats.org/officeDocument/2006/relationships" xmlns:p="http://schemas.openxmlformats.org/presentationml/2006/main">
+  <p:cSld>
+    <p:spTree>
+      <p:nvGrpSpPr>
+        <p:cNvPr id="1" name=""/>
+        <p:cNvGrpSpPr/>
+        <p:nvPr/>
+      </p:nvGrpSpPr>
+      <p:grpSpPr>
+        <a:xfrm>
+          <a:off x="0" y="0"/>
+          <a:ext cx="0" cy="0"/>
+          <a:chOff x="0" y="0"/>
+          <a:chExt cx="0" cy="0"/>
+        </a:xfrm>
+      </p:grpSpPr>
+      <p:sp>
+        <p:nvSpPr>
+          <p:cNvPr id="2" name="Slide Image Placeholder 1"/>
+          <p:cNvSpPr>
+            <a:spLocks noGrp="1" noRot="1" noChangeAspect="1"/>
+          </p:cNvSpPr>
+          <p:nvPr>
+            <p:ph type="sldImg"/>
+          </p:nvPr>
+        </p:nvSpPr>
+        <p:spPr/>
+      </p:sp>
+      <p:sp>
+        <p:nvSpPr>
+          <p:cNvPr id="3" name="Notes Placeholder 2"/>
+          <p:cNvSpPr>
+            <a:spLocks noGrp="1"/>
+          </p:cNvSpPr>
+          <p:nvPr>
+            <p:ph type="body" idx="1"/>
+          </p:nvPr>
+        </p:nvSpPr>
+        <p:spPr/>
+        <p:txBody>
+          <a:bodyPr/>
+          <a:lstStyle/>
+          <a:p>
+            <a:r>
               <a:rPr lang="en-US" sz="1200" b="1" kern="1200" dirty="0" smtClean="0">
                 <a:solidFill>
                   <a:schemeClr val="tx1"/>
@@ -581,7 +759,31 @@
                 <a:ea typeface="+mn-ea"/>
                 <a:cs typeface="+mn-cs"/>
               </a:rPr>
-              <a:t>As an example, imagine a site that needs to handle UI events, query and process large amounts of API data, and manipulate the DOM. Pretty common, right? Unfortunately all of that can't be simultaneous due to limitations in browsers' JavaScript runtime. Script execution happens within a single thread.</a:t>
+              <a:t>As an example</a:t>
+            </a:r>
+            <a:r>
+              <a:rPr lang="en-US" sz="1200" b="1" kern="1200" dirty="0" smtClean="0">
+                <a:solidFill>
+                  <a:schemeClr val="tx1"/>
+                </a:solidFill>
+                <a:effectLst/>
+                <a:latin typeface="+mn-lt"/>
+                <a:ea typeface="+mn-ea"/>
+                <a:cs typeface="+mn-cs"/>
+              </a:rPr>
+              <a:t>, imagine a site that needs to handle UI events, query and process large amounts of API data, and manipulate the DOM. </a:t>
+            </a:r>
+            <a:r>
+              <a:rPr lang="en-US" sz="1200" kern="1200" dirty="0" smtClean="0">
+                <a:solidFill>
+                  <a:schemeClr val="tx1"/>
+                </a:solidFill>
+                <a:effectLst/>
+                <a:latin typeface="+mn-lt"/>
+                <a:ea typeface="+mn-ea"/>
+                <a:cs typeface="+mn-cs"/>
+              </a:rPr>
+              <a:t>Pretty common, right? Unfortunately all of that can't be simultaneous due to limitations in browsers' JavaScript runtime. Script execution happens within a single thread.</a:t>
             </a:r>
           </a:p>
           <a:p>
@@ -729,42 +931,42 @@
                 <a:ea typeface="+mn-ea"/>
                 <a:cs typeface="+mn-cs"/>
               </a:rPr>
-              <a:t> specification defines an API for spawning background scripts in your web application. Web Workers allow you to do things like fire up long-running scripts to handle computationally intensive tasks, but without blocking the UI or other scripts to handle user interactions. </a:t>
-            </a:r>
-            <a:r>
-              <a:rPr lang="en-US" sz="1200" kern="1200" smtClean="0">
-                <a:solidFill>
-                  <a:schemeClr val="tx1"/>
-                </a:solidFill>
-                <a:effectLst/>
-                <a:latin typeface="+mn-lt"/>
-                <a:ea typeface="+mn-ea"/>
-                <a:cs typeface="+mn-cs"/>
-              </a:rPr>
-              <a:t>They're going to help put and end to that nasty 'unresponsive script' dialog that we've all come to love:</a:t>
-            </a:r>
-          </a:p>
-          <a:p>
-            <a:endParaRPr lang="en-US" smtClean="0"/>
-          </a:p>
-          <a:p>
-            <a:r>
-              <a:rPr lang="en-US" dirty="0" smtClean="0"/>
-              <a:t>Long</a:t>
-            </a:r>
-            <a:r>
-              <a:rPr lang="en-US" baseline="0" dirty="0" smtClean="0"/>
-              <a:t> running code that doesn’t create any </a:t>
-            </a:r>
-            <a:r>
-              <a:rPr lang="en-US" baseline="0" dirty="0" err="1" smtClean="0"/>
+              <a:t> specification defines an API for spawning background scripts in your web application. Web Workers allow you to do things like fire up long-running scripts to handle computationally intensive tasks, but without blocking the UI or other scripts to handle user interactions. They're going to help put and end to that nasty 'unresponsive script' dialog that we've all come to love:</a:t>
+            </a:r>
+          </a:p>
+          <a:p>
+            <a:endParaRPr lang="en-US" dirty="0" smtClean="0"/>
+          </a:p>
+          <a:p>
+            <a:r>
+              <a:rPr lang="en-US" b="1" dirty="0" smtClean="0"/>
+              <a:t>The goal is to stop Long</a:t>
+            </a:r>
+            <a:r>
+              <a:rPr lang="en-US" b="1" baseline="0" dirty="0" smtClean="0"/>
+              <a:t> </a:t>
+            </a:r>
+            <a:r>
+              <a:rPr lang="en-US" b="1" baseline="0" dirty="0" smtClean="0"/>
+              <a:t>running </a:t>
+            </a:r>
+            <a:r>
+              <a:rPr lang="en-US" b="1" baseline="0" dirty="0" smtClean="0"/>
+              <a:t>code from creating </a:t>
+            </a:r>
+            <a:r>
+              <a:rPr lang="en-US" b="1" baseline="0" dirty="0" err="1" smtClean="0"/>
               <a:t>jank</a:t>
             </a:r>
             <a:r>
-              <a:rPr lang="en-US" baseline="0" dirty="0" smtClean="0"/>
-              <a:t> to the main thread</a:t>
-            </a:r>
-            <a:endParaRPr lang="en-US" dirty="0"/>
+              <a:rPr lang="en-US" b="1" baseline="0" dirty="0" smtClean="0"/>
+              <a:t> </a:t>
+            </a:r>
+            <a:r>
+              <a:rPr lang="en-US" b="1" baseline="0" dirty="0" smtClean="0"/>
+              <a:t>to the main thread</a:t>
+            </a:r>
+            <a:endParaRPr lang="en-US" b="1" dirty="0"/>
           </a:p>
         </p:txBody>
       </p:sp>
@@ -3928,27 +4130,214 @@
         <p:spPr/>
         <p:txBody>
           <a:bodyPr>
-            <a:normAutofit fontScale="92500" lnSpcReduction="10000"/>
+            <a:normAutofit fontScale="92500" lnSpcReduction="20000"/>
           </a:bodyPr>
           <a:lstStyle/>
           <a:p>
             <a:r>
               <a:rPr lang="en-US" dirty="0" smtClean="0"/>
-              <a:t>Most devices refresh their screen 60 times per second, 60 frames per second 60 Hz, 60 fps,</a:t>
-            </a:r>
-          </a:p>
-          <a:p>
-            <a:pPr marL="0" indent="0">
-              <a:buNone/>
-            </a:pPr>
-            <a:r>
-              <a:rPr lang="en-US" dirty="0"/>
-              <a:t>	</a:t>
-            </a:r>
-            <a:r>
-              <a:rPr lang="en-US" dirty="0" smtClean="0"/>
-              <a:t>16.67ms/frame, 10ms/frame to avoid browser’s housekeeping work</a:t>
-            </a:r>
+              <a:t>Most devices refresh their screen 60 times per second, 60 frames per second 60 Hz, 60 </a:t>
+            </a:r>
+            <a:r>
+              <a:rPr lang="en-US" dirty="0" smtClean="0"/>
+              <a:t>fps</a:t>
+            </a:r>
+            <a:endParaRPr lang="en-US" dirty="0"/>
+          </a:p>
+          <a:p>
+            <a:pPr lvl="1"/>
+            <a:r>
+              <a:rPr lang="en-US" dirty="0" smtClean="0"/>
+              <a:t>16.67ms</a:t>
+            </a:r>
+            <a:r>
+              <a:rPr lang="en-US" dirty="0" smtClean="0"/>
+              <a:t>/frame, 10ms/frame to avoid browser’s housekeeping </a:t>
+            </a:r>
+            <a:r>
+              <a:rPr lang="en-US" dirty="0" smtClean="0"/>
+              <a:t>work</a:t>
+            </a:r>
+          </a:p>
+          <a:p>
+            <a:pPr lvl="1"/>
+            <a:r>
+              <a:rPr lang="en-US" b="1" spc="100" dirty="0">
+                <a:ln w="18000">
+                  <a:solidFill>
+                    <a:schemeClr val="accent1">
+                      <a:satMod val="200000"/>
+                      <a:tint val="72000"/>
+                    </a:schemeClr>
+                  </a:solidFill>
+                  <a:prstDash val="solid"/>
+                </a:ln>
+                <a:solidFill>
+                  <a:schemeClr val="accent1">
+                    <a:satMod val="280000"/>
+                    <a:tint val="100000"/>
+                    <a:alpha val="5700"/>
+                  </a:schemeClr>
+                </a:solidFill>
+                <a:effectLst>
+                  <a:outerShdw blurRad="25000" dist="20000" dir="16020000" algn="tl">
+                    <a:schemeClr val="accent1">
+                      <a:satMod val="200000"/>
+                      <a:shade val="1000"/>
+                      <a:alpha val="60000"/>
+                    </a:schemeClr>
+                  </a:outerShdw>
+                </a:effectLst>
+              </a:rPr>
+              <a:t>http://</a:t>
+            </a:r>
+            <a:r>
+              <a:rPr lang="en-US" b="1" spc="100" dirty="0" err="1">
+                <a:ln w="18000">
+                  <a:solidFill>
+                    <a:schemeClr val="accent1">
+                      <a:satMod val="200000"/>
+                      <a:tint val="72000"/>
+                    </a:schemeClr>
+                  </a:solidFill>
+                  <a:prstDash val="solid"/>
+                </a:ln>
+                <a:solidFill>
+                  <a:schemeClr val="accent1">
+                    <a:satMod val="280000"/>
+                    <a:tint val="100000"/>
+                    <a:alpha val="5700"/>
+                  </a:schemeClr>
+                </a:solidFill>
+                <a:effectLst>
+                  <a:outerShdw blurRad="25000" dist="20000" dir="16020000" algn="tl">
+                    <a:schemeClr val="accent1">
+                      <a:satMod val="200000"/>
+                      <a:shade val="1000"/>
+                      <a:alpha val="60000"/>
+                    </a:schemeClr>
+                  </a:outerShdw>
+                </a:effectLst>
+              </a:rPr>
+              <a:t>jakearchibald.github.io</a:t>
+            </a:r>
+            <a:r>
+              <a:rPr lang="en-US" b="1" spc="100" dirty="0">
+                <a:ln w="18000">
+                  <a:solidFill>
+                    <a:schemeClr val="accent1">
+                      <a:satMod val="200000"/>
+                      <a:tint val="72000"/>
+                    </a:schemeClr>
+                  </a:solidFill>
+                  <a:prstDash val="solid"/>
+                </a:ln>
+                <a:solidFill>
+                  <a:schemeClr val="accent1">
+                    <a:satMod val="280000"/>
+                    <a:tint val="100000"/>
+                    <a:alpha val="5700"/>
+                  </a:schemeClr>
+                </a:solidFill>
+                <a:effectLst>
+                  <a:outerShdw blurRad="25000" dist="20000" dir="16020000" algn="tl">
+                    <a:schemeClr val="accent1">
+                      <a:satMod val="200000"/>
+                      <a:shade val="1000"/>
+                      <a:alpha val="60000"/>
+                    </a:schemeClr>
+                  </a:outerShdw>
+                </a:effectLst>
+              </a:rPr>
+              <a:t>/</a:t>
+            </a:r>
+            <a:r>
+              <a:rPr lang="en-US" b="1" spc="100" dirty="0" err="1">
+                <a:ln w="18000">
+                  <a:solidFill>
+                    <a:schemeClr val="accent1">
+                      <a:satMod val="200000"/>
+                      <a:tint val="72000"/>
+                    </a:schemeClr>
+                  </a:solidFill>
+                  <a:prstDash val="solid"/>
+                </a:ln>
+                <a:solidFill>
+                  <a:schemeClr val="accent1">
+                    <a:satMod val="280000"/>
+                    <a:tint val="100000"/>
+                    <a:alpha val="5700"/>
+                  </a:schemeClr>
+                </a:solidFill>
+                <a:effectLst>
+                  <a:outerShdw blurRad="25000" dist="20000" dir="16020000" algn="tl">
+                    <a:schemeClr val="accent1">
+                      <a:satMod val="200000"/>
+                      <a:shade val="1000"/>
+                      <a:alpha val="60000"/>
+                    </a:schemeClr>
+                  </a:outerShdw>
+                </a:effectLst>
+              </a:rPr>
+              <a:t>jank</a:t>
+            </a:r>
+            <a:r>
+              <a:rPr lang="en-US" b="1" spc="100" dirty="0">
+                <a:ln w="18000">
+                  <a:solidFill>
+                    <a:schemeClr val="accent1">
+                      <a:satMod val="200000"/>
+                      <a:tint val="72000"/>
+                    </a:schemeClr>
+                  </a:solidFill>
+                  <a:prstDash val="solid"/>
+                </a:ln>
+                <a:solidFill>
+                  <a:schemeClr val="accent1">
+                    <a:satMod val="280000"/>
+                    <a:tint val="100000"/>
+                    <a:alpha val="5700"/>
+                  </a:schemeClr>
+                </a:solidFill>
+                <a:effectLst>
+                  <a:outerShdw blurRad="25000" dist="20000" dir="16020000" algn="tl">
+                    <a:schemeClr val="accent1">
+                      <a:satMod val="200000"/>
+                      <a:shade val="1000"/>
+                      <a:alpha val="60000"/>
+                    </a:schemeClr>
+                  </a:outerShdw>
+                </a:effectLst>
+              </a:rPr>
+              <a:t>-invaders/</a:t>
+            </a:r>
+            <a:endParaRPr lang="en-US" b="1" spc="100" dirty="0" smtClean="0">
+              <a:ln w="18000">
+                <a:solidFill>
+                  <a:schemeClr val="accent1">
+                    <a:satMod val="200000"/>
+                    <a:tint val="72000"/>
+                  </a:schemeClr>
+                </a:solidFill>
+                <a:prstDash val="solid"/>
+              </a:ln>
+              <a:solidFill>
+                <a:schemeClr val="accent1">
+                  <a:satMod val="280000"/>
+                  <a:tint val="100000"/>
+                  <a:alpha val="5700"/>
+                </a:schemeClr>
+              </a:solidFill>
+              <a:effectLst>
+                <a:outerShdw blurRad="25000" dist="20000" dir="16020000" algn="tl">
+                  <a:schemeClr val="accent1">
+                    <a:satMod val="200000"/>
+                    <a:shade val="1000"/>
+                    <a:alpha val="60000"/>
+                  </a:schemeClr>
+                </a:outerShdw>
+              </a:effectLst>
+            </a:endParaRPr>
           </a:p>
           <a:p>
             <a:pPr marL="0" indent="0">
@@ -4554,15 +4943,15 @@
           <a:lstStyle/>
           <a:p>
             <a:r>
-              <a:rPr lang="en-US" dirty="0" smtClean="0"/>
+              <a:rPr lang="en-US" b="1" dirty="0" smtClean="0"/>
               <a:t>Chrome </a:t>
             </a:r>
             <a:r>
-              <a:rPr lang="en-US" dirty="0" err="1" smtClean="0"/>
+              <a:rPr lang="en-US" b="1" dirty="0" err="1" smtClean="0"/>
               <a:t>Dev</a:t>
             </a:r>
             <a:r>
-              <a:rPr lang="en-US" dirty="0" smtClean="0"/>
+              <a:rPr lang="en-US" b="1" dirty="0" smtClean="0"/>
               <a:t> Tool – Timeline</a:t>
             </a:r>
           </a:p>
@@ -4598,10 +4987,10 @@
           </a:p>
           <a:p>
             <a:r>
-              <a:rPr lang="en-US" dirty="0" smtClean="0"/>
+              <a:rPr lang="en-US" b="1" dirty="0" smtClean="0"/>
               <a:t>Measure first, then optimize</a:t>
             </a:r>
-            <a:endParaRPr lang="en-US" dirty="0"/>
+            <a:endParaRPr lang="en-US" b="1" dirty="0"/>
           </a:p>
         </p:txBody>
       </p:sp>
@@ -4711,26 +5100,24 @@
               <a:rPr lang="en-US" dirty="0" smtClean="0"/>
               <a:t> Compiler: </a:t>
             </a:r>
-          </a:p>
-          <a:p>
-            <a:r>
-              <a:rPr lang="en-US" dirty="0" smtClean="0"/>
-              <a:t>The Code you wrote may not be the code </a:t>
-            </a:r>
-            <a:r>
-              <a:rPr lang="en-US" dirty="0" smtClean="0"/>
-              <a:t>runs</a:t>
-            </a:r>
+            <a:endParaRPr lang="en-US" dirty="0" smtClean="0"/>
           </a:p>
           <a:p>
             <a:pPr lvl="1"/>
             <a:r>
               <a:rPr lang="en-US" dirty="0" smtClean="0"/>
-              <a:t>Just </a:t>
-            </a:r>
-            <a:r>
-              <a:rPr lang="en-US" dirty="0" smtClean="0"/>
-              <a:t>In Time compiler (JIT) very complicated engine</a:t>
+              <a:t>The </a:t>
+            </a:r>
+            <a:r>
+              <a:rPr lang="en-US" dirty="0" smtClean="0"/>
+              <a:t>Code you wrote may not be the code runs</a:t>
+            </a:r>
+          </a:p>
+          <a:p>
+            <a:pPr lvl="1"/>
+            <a:r>
+              <a:rPr lang="en-US" dirty="0" smtClean="0"/>
+              <a:t>Just In Time compiler (JIT) very complicated engine</a:t>
             </a:r>
             <a:r>
               <a:rPr lang="en-US" dirty="0"/>
@@ -4738,21 +5125,8 @@
             </a:r>
             <a:r>
               <a:rPr lang="en-US" dirty="0" smtClean="0"/>
-              <a:t>to </a:t>
-            </a:r>
-            <a:r>
-              <a:rPr lang="en-US" dirty="0" smtClean="0"/>
-              <a:t>make </a:t>
-            </a:r>
-            <a:r>
-              <a:rPr lang="en-US" dirty="0" smtClean="0"/>
-              <a:t>the code run </a:t>
-            </a:r>
-            <a:r>
-              <a:rPr lang="en-US" dirty="0" smtClean="0"/>
-              <a:t>fast</a:t>
-            </a:r>
-            <a:endParaRPr lang="en-US" dirty="0" smtClean="0"/>
+              <a:t>to make the code run fast</a:t>
+            </a:r>
           </a:p>
           <a:p>
             <a:pPr lvl="1"/>
@@ -5013,11 +5387,7 @@
           <a:p>
             <a:r>
               <a:rPr lang="en-US" sz="2400" dirty="0" smtClean="0"/>
-              <a:t>Two </a:t>
-            </a:r>
-            <a:r>
-              <a:rPr lang="en-US" sz="2400" dirty="0" smtClean="0"/>
-              <a:t>types: Dedicated Workers and Shared Workers</a:t>
+              <a:t>Two types: Dedicated Workers and Shared Workers</a:t>
             </a:r>
           </a:p>
           <a:p>
@@ -5039,7 +5409,7 @@
         </p:nvSpPr>
         <p:spPr>
           <a:xfrm>
-            <a:off x="457200" y="6125093"/>
+            <a:off x="558219" y="1230868"/>
             <a:ext cx="8229600" cy="369332"/>
           </a:xfrm>
           <a:prstGeom prst="rect">
@@ -5108,6 +5478,47 @@
           </a:prstGeom>
         </p:spPr>
       </p:pic>
+      <p:sp>
+        <p:nvSpPr>
+          <p:cNvPr id="6" name="Rectangle 5"/>
+          <p:cNvSpPr/>
+          <p:nvPr/>
+        </p:nvSpPr>
+        <p:spPr>
+          <a:xfrm>
+            <a:off x="558218" y="6126163"/>
+            <a:ext cx="7465555" cy="369332"/>
+          </a:xfrm>
+          <a:prstGeom prst="rect">
+            <a:avLst/>
+          </a:prstGeom>
+          <a:solidFill>
+            <a:schemeClr val="accent3">
+              <a:lumMod val="75000"/>
+            </a:schemeClr>
+          </a:solidFill>
+        </p:spPr>
+        <p:txBody>
+          <a:bodyPr wrap="square">
+            <a:spAutoFit/>
+          </a:bodyPr>
+          <a:lstStyle/>
+          <a:p>
+            <a:r>
+              <a:rPr lang="en-US" dirty="0"/>
+              <a:t>http://</a:t>
+            </a:r>
+            <a:r>
+              <a:rPr lang="en-US" dirty="0" err="1"/>
+              <a:t>canaantt.github.io</a:t>
+            </a:r>
+            <a:r>
+              <a:rPr lang="en-US" dirty="0"/>
+              <a:t>/web-workers-demo-master/</a:t>
+            </a:r>
+          </a:p>
+        </p:txBody>
+      </p:sp>
     </p:spTree>
     <p:extLst>
       <p:ext uri="{BB962C8B-B14F-4D97-AF65-F5344CB8AC3E}">
@@ -5734,7 +6145,7 @@
         <p:spPr>
           <a:xfrm>
             <a:off x="1920240" y="1757680"/>
-            <a:ext cx="4484371" cy="2031325"/>
+            <a:ext cx="4801314" cy="2031325"/>
           </a:xfrm>
           <a:prstGeom prst="rect">
             <a:avLst/>
@@ -5747,36 +6158,60 @@
           </a:bodyPr>
           <a:lstStyle/>
           <a:p>
+            <a:pPr marL="342900" indent="-342900">
+              <a:buFont typeface="+mj-lt"/>
+              <a:buAutoNum type="arabicPeriod"/>
+            </a:pPr>
             <a:r>
               <a:rPr lang="en-US" dirty="0" smtClean="0"/>
               <a:t>Begin constructing the DOM by parsing HTML</a:t>
             </a:r>
           </a:p>
           <a:p>
+            <a:pPr marL="342900" indent="-342900">
+              <a:buFont typeface="+mj-lt"/>
+              <a:buAutoNum type="arabicPeriod"/>
+            </a:pPr>
             <a:r>
               <a:rPr lang="en-US" dirty="0" smtClean="0"/>
               <a:t>Request CSS &amp; JS resources</a:t>
             </a:r>
           </a:p>
           <a:p>
+            <a:pPr marL="342900" indent="-342900">
+              <a:buFont typeface="+mj-lt"/>
+              <a:buAutoNum type="arabicPeriod"/>
+            </a:pPr>
             <a:r>
               <a:rPr lang="en-US" dirty="0" smtClean="0"/>
               <a:t>Parse CSS and construct the CSSOM tree</a:t>
             </a:r>
           </a:p>
           <a:p>
+            <a:pPr marL="342900" indent="-342900">
+              <a:buFont typeface="+mj-lt"/>
+              <a:buAutoNum type="arabicPeriod"/>
+            </a:pPr>
             <a:r>
               <a:rPr lang="en-US" dirty="0" smtClean="0"/>
               <a:t>Execute JS</a:t>
             </a:r>
           </a:p>
           <a:p>
+            <a:pPr marL="342900" indent="-342900">
+              <a:buFont typeface="+mj-lt"/>
+              <a:buAutoNum type="arabicPeriod"/>
+            </a:pPr>
             <a:r>
               <a:rPr lang="en-US" dirty="0" smtClean="0"/>
               <a:t>Merge DOM and CSSOM into the Render Tree</a:t>
             </a:r>
           </a:p>
           <a:p>
+            <a:pPr marL="342900" indent="-342900">
+              <a:buFont typeface="+mj-lt"/>
+              <a:buAutoNum type="arabicPeriod"/>
+            </a:pPr>
             <a:r>
               <a:rPr lang="en-US" dirty="0" smtClean="0"/>
               <a:t>Run Layout, paint</a:t>
@@ -6173,15 +6608,15 @@
           </a:p>
           <a:p>
             <a:r>
-              <a:rPr lang="en-US" sz="2800" dirty="0" smtClean="0"/>
+              <a:rPr lang="en-US" sz="2800" b="1" dirty="0" smtClean="0"/>
               <a:t>Parser blocking if it modifies the DOM because it blocks, DOM construction when we encounter the script tag, especially the </a:t>
             </a:r>
             <a:r>
-              <a:rPr lang="en-US" sz="2800" dirty="0" err="1" smtClean="0"/>
+              <a:rPr lang="en-US" sz="2800" b="1" dirty="0" err="1" smtClean="0"/>
               <a:t>js</a:t>
             </a:r>
             <a:r>
-              <a:rPr lang="en-US" sz="2800" dirty="0" smtClean="0"/>
+              <a:rPr lang="en-US" sz="2800" b="1" dirty="0" smtClean="0"/>
               <a:t> is an external file</a:t>
             </a:r>
           </a:p>
@@ -6365,12 +6800,12 @@
           </a:p>
           <a:p>
             <a:r>
-              <a:rPr lang="en-US" dirty="0" err="1" smtClean="0"/>
-              <a:t>Mimize</a:t>
-            </a:r>
-            <a:r>
-              <a:rPr lang="en-US" dirty="0" smtClean="0"/>
-              <a:t> use of render blocking resource(CSS)</a:t>
+              <a:rPr lang="en-US" dirty="0" smtClean="0"/>
+              <a:t>Minimize </a:t>
+            </a:r>
+            <a:r>
+              <a:rPr lang="en-US" dirty="0" smtClean="0"/>
+              <a:t>use of render blocking resource(CSS)</a:t>
             </a:r>
           </a:p>
           <a:p>

</xml_diff>